<commit_message>
Add minor content updates for 2024
</commit_message>
<xml_diff>
--- a/cits1003-lecture_slides/CITS1003-6 Vulnerabilities - exercises.pptx
+++ b/cits1003-lecture_slides/CITS1003-6 Vulnerabilities - exercises.pptx
@@ -1043,6 +1043,29 @@
     </pc:docChg>
   </pc:docChgLst>
   <pc:docChgLst>
+    <pc:chgData name="Robert McKnight" userId="d5c7fb24-67df-49c0-a0e8-7fe946ae099c" providerId="ADAL" clId="{0584A50F-1B61-4B36-B68F-2571E8BD5975}"/>
+    <pc:docChg chg="modSld sldOrd">
+      <pc:chgData name="Robert McKnight" userId="d5c7fb24-67df-49c0-a0e8-7fe946ae099c" providerId="ADAL" clId="{0584A50F-1B61-4B36-B68F-2571E8BD5975}" dt="2023-07-28T06:01:37.141" v="5"/>
+      <pc:docMkLst>
+        <pc:docMk/>
+      </pc:docMkLst>
+      <pc:sldChg chg="ord">
+        <pc:chgData name="Robert McKnight" userId="d5c7fb24-67df-49c0-a0e8-7fe946ae099c" providerId="ADAL" clId="{0584A50F-1B61-4B36-B68F-2571E8BD5975}" dt="2023-07-28T05:56:33.712" v="3"/>
+        <pc:sldMkLst>
+          <pc:docMk/>
+          <pc:sldMk cId="83042184" sldId="274"/>
+        </pc:sldMkLst>
+      </pc:sldChg>
+      <pc:sldChg chg="ord">
+        <pc:chgData name="Robert McKnight" userId="d5c7fb24-67df-49c0-a0e8-7fe946ae099c" providerId="ADAL" clId="{0584A50F-1B61-4B36-B68F-2571E8BD5975}" dt="2023-07-28T06:01:37.141" v="5"/>
+        <pc:sldMkLst>
+          <pc:docMk/>
+          <pc:sldMk cId="3703756529" sldId="277"/>
+        </pc:sldMkLst>
+      </pc:sldChg>
+    </pc:docChg>
+  </pc:docChgLst>
+  <pc:docChgLst>
     <pc:chgData name="张 智" userId="36bdf691fd3510be" providerId="LiveId" clId="{DEF9B1AC-03A4-4645-B5D9-44517BBD58F4}"/>
     <pc:docChg chg="custSel modSld">
       <pc:chgData name="张 智" userId="36bdf691fd3510be" providerId="LiveId" clId="{DEF9B1AC-03A4-4645-B5D9-44517BBD58F4}" dt="2023-03-26T14:19:11.974" v="520" actId="20577"/>
@@ -1172,7 +1195,7 @@
           <a:p>
             <a:fld id="{6D6D7260-B7E4-B548-BD1F-84ED14536037}" type="datetimeFigureOut">
               <a:rPr lang="en-AU" smtClean="0"/>
-              <a:t>27/03/2023</a:t>
+              <a:t>28/07/2023</a:t>
             </a:fld>
             <a:endParaRPr lang="en-AU"/>
           </a:p>
@@ -6942,7 +6965,7 @@
           <a:p>
             <a:fld id="{88D38747-4367-4BD2-8D51-C97E202738E2}" type="datetime1">
               <a:rPr lang="en-US" smtClean="0"/>
-              <a:t>3/27/2023</a:t>
+              <a:t>7/28/2023</a:t>
             </a:fld>
             <a:endParaRPr lang="en-US" dirty="0"/>
           </a:p>
@@ -7247,7 +7270,7 @@
           <a:p>
             <a:fld id="{11F1B079-7EF0-44EE-B798-BCC497C9F3B2}" type="datetime1">
               <a:rPr lang="en-US" smtClean="0"/>
-              <a:t>3/27/2023</a:t>
+              <a:t>7/28/2023</a:t>
             </a:fld>
             <a:endParaRPr lang="en-US" dirty="0"/>
           </a:p>
@@ -7441,7 +7464,7 @@
           <a:p>
             <a:fld id="{28FF70A8-1D13-4657-95F0-A9EA54967B8D}" type="datetime1">
               <a:rPr lang="en-US" smtClean="0"/>
-              <a:t>3/27/2023</a:t>
+              <a:t>7/28/2023</a:t>
             </a:fld>
             <a:endParaRPr lang="en-US" dirty="0"/>
           </a:p>
@@ -7704,7 +7727,7 @@
           <a:p>
             <a:fld id="{21EB90AC-71BD-4C7F-8ACA-7B3F18292E63}" type="datetime1">
               <a:rPr lang="en-US" smtClean="0"/>
-              <a:t>3/27/2023</a:t>
+              <a:t>7/28/2023</a:t>
             </a:fld>
             <a:endParaRPr lang="en-US" dirty="0"/>
           </a:p>
@@ -8140,7 +8163,7 @@
           <a:p>
             <a:fld id="{4E6EFC2C-8905-46F0-B443-CE905B76BA01}" type="datetime1">
               <a:rPr lang="en-US" smtClean="0"/>
-              <a:t>3/27/2023</a:t>
+              <a:t>7/28/2023</a:t>
             </a:fld>
             <a:endParaRPr lang="en-US" dirty="0"/>
           </a:p>
@@ -8677,7 +8700,7 @@
           <a:p>
             <a:fld id="{D9079DC3-C9B5-499E-9140-0DC28B7074E2}" type="datetime1">
               <a:rPr lang="en-US" smtClean="0"/>
-              <a:t>3/27/2023</a:t>
+              <a:t>7/28/2023</a:t>
             </a:fld>
             <a:endParaRPr lang="en-US" dirty="0"/>
           </a:p>
@@ -9559,7 +9582,7 @@
           <a:p>
             <a:fld id="{30BB33EA-E472-4D22-9C03-A9C14AA21CED}" type="datetime1">
               <a:rPr lang="en-US" smtClean="0"/>
-              <a:t>3/27/2023</a:t>
+              <a:t>7/28/2023</a:t>
             </a:fld>
             <a:endParaRPr lang="en-US" dirty="0"/>
           </a:p>
@@ -9729,7 +9752,7 @@
           <a:p>
             <a:fld id="{217E833E-1B6D-415F-AD29-75AE8C43BD0D}" type="datetime1">
               <a:rPr lang="en-US" smtClean="0"/>
-              <a:t>3/27/2023</a:t>
+              <a:t>7/28/2023</a:t>
             </a:fld>
             <a:endParaRPr lang="en-US" dirty="0"/>
           </a:p>
@@ -9913,7 +9936,7 @@
           <a:p>
             <a:fld id="{8452596F-08A7-4B70-989A-F2B1CF31E66B}" type="datetime1">
               <a:rPr lang="en-US" smtClean="0"/>
-              <a:t>3/27/2023</a:t>
+              <a:t>7/28/2023</a:t>
             </a:fld>
             <a:endParaRPr lang="en-US" dirty="0"/>
           </a:p>
@@ -10083,7 +10106,7 @@
           <a:p>
             <a:fld id="{73C55A3C-5767-4844-A0A3-83778C2E5409}" type="datetime1">
               <a:rPr lang="en-US" smtClean="0"/>
-              <a:t>3/27/2023</a:t>
+              <a:t>7/28/2023</a:t>
             </a:fld>
             <a:endParaRPr lang="en-US" dirty="0"/>
           </a:p>
@@ -10327,7 +10350,7 @@
           <a:p>
             <a:fld id="{CAE507A8-A5CF-4D38-AB86-7EDDA87A85D4}" type="datetime1">
               <a:rPr lang="en-US" smtClean="0"/>
-              <a:t>3/27/2023</a:t>
+              <a:t>7/28/2023</a:t>
             </a:fld>
             <a:endParaRPr lang="en-US" dirty="0"/>
           </a:p>
@@ -10569,7 +10592,7 @@
           <a:p>
             <a:fld id="{BDFCD27C-8599-43EF-BA1D-14DDC1946E06}" type="datetime1">
               <a:rPr lang="en-US" smtClean="0"/>
-              <a:t>3/27/2023</a:t>
+              <a:t>7/28/2023</a:t>
             </a:fld>
             <a:endParaRPr lang="en-US" dirty="0"/>
           </a:p>
@@ -11050,7 +11073,7 @@
           <a:p>
             <a:fld id="{49343D99-809A-49C0-96E5-4250D0B498EE}" type="datetime1">
               <a:rPr lang="en-US" smtClean="0"/>
-              <a:t>3/27/2023</a:t>
+              <a:t>7/28/2023</a:t>
             </a:fld>
             <a:endParaRPr lang="en-US" dirty="0"/>
           </a:p>
@@ -11168,7 +11191,7 @@
           <a:p>
             <a:fld id="{A143DE9B-B678-4EFB-BB7D-A4370204A0B0}" type="datetime1">
               <a:rPr lang="en-US" smtClean="0"/>
-              <a:t>3/27/2023</a:t>
+              <a:t>7/28/2023</a:t>
             </a:fld>
             <a:endParaRPr lang="en-US" dirty="0"/>
           </a:p>
@@ -11263,7 +11286,7 @@
           <a:p>
             <a:fld id="{E68812DA-F765-4142-A6A3-A8ED7235E082}" type="datetime1">
               <a:rPr lang="en-US" smtClean="0"/>
-              <a:t>3/27/2023</a:t>
+              <a:t>7/28/2023</a:t>
             </a:fld>
             <a:endParaRPr lang="en-US" dirty="0"/>
           </a:p>
@@ -11518,7 +11541,7 @@
           <a:p>
             <a:fld id="{3E0277FD-7DE6-41D4-930D-AC99F5AFE54E}" type="datetime1">
               <a:rPr lang="en-US" smtClean="0"/>
-              <a:t>3/27/2023</a:t>
+              <a:t>7/28/2023</a:t>
             </a:fld>
             <a:endParaRPr lang="en-US" dirty="0"/>
           </a:p>
@@ -11825,7 +11848,7 @@
           <a:p>
             <a:fld id="{9EA15526-7079-4B7B-987C-1B5FAE11A0FF}" type="datetime1">
               <a:rPr lang="en-US" smtClean="0"/>
-              <a:t>3/27/2023</a:t>
+              <a:t>7/28/2023</a:t>
             </a:fld>
             <a:endParaRPr lang="en-US" dirty="0"/>
           </a:p>
@@ -12060,7 +12083,7 @@
           <a:p>
             <a:fld id="{073ED0CC-082F-4160-86E5-0D6041F12778}" type="datetime1">
               <a:rPr lang="en-US" smtClean="0"/>
-              <a:t>3/27/2023</a:t>
+              <a:t>7/28/2023</a:t>
             </a:fld>
             <a:endParaRPr lang="en-US" dirty="0"/>
           </a:p>
@@ -12971,7 +12994,7 @@
           </a:effectLst>
           <a:extLst>
             <a:ext uri="{91240B29-F687-4f45-9708-019B960494DF}">
-              <a14:hiddenLine xmlns="" xmlns:a14="http://schemas.microsoft.com/office/drawing/2010/main" xmlns:p14="http://schemas.microsoft.com/office/powerpoint/2010/main" xmlns:a16="http://schemas.microsoft.com/office/drawing/2014/main" w="9525">
+              <a14:hiddenLine xmlns:a16="http://schemas.microsoft.com/office/drawing/2014/main" xmlns:p14="http://schemas.microsoft.com/office/powerpoint/2010/main" xmlns:a14="http://schemas.microsoft.com/office/drawing/2010/main" xmlns="" w="9525">
                 <a:solidFill>
                   <a:srgbClr val="000000"/>
                 </a:solidFill>

</xml_diff>